<commit_message>
Fixes #117 the unspecifed platform in the specs are gone
It now defaults to CentOS and encourages the learner to make the
changes immediately.

Signed-off-by: Franklin Webber <franklin@chef.io>
</commit_message>
<xml_diff>
--- a/07-refactoring_to_attributes.pptx
+++ b/07-refactoring_to_attributes.pptx
@@ -6801,14 +6801,14 @@
           </a:ln>
           <a:extLst>
             <a:ext uri="{909E8E84-426E-40dd-AFC4-6F175D3DCCD1}">
-              <a14:hiddenFill xmlns="" xmlns:a14="http://schemas.microsoft.com/office/drawing/2010/main">
+              <a14:hiddenFill xmlns:a14="http://schemas.microsoft.com/office/drawing/2010/main" xmlns="">
                 <a:solidFill>
                   <a:srgbClr val="FFFFFF"/>
                 </a:solidFill>
               </a14:hiddenFill>
             </a:ext>
             <a:ext uri="{91240B29-F687-4f45-9708-019B960494DF}">
-              <a14:hiddenLine xmlns="" xmlns:a14="http://schemas.microsoft.com/office/drawing/2010/main" w="9525">
+              <a14:hiddenLine xmlns:a14="http://schemas.microsoft.com/office/drawing/2010/main" xmlns="" w="9525">
                 <a:solidFill>
                   <a:srgbClr val="000000"/>
                 </a:solidFill>
@@ -6956,14 +6956,14 @@
           </a:ln>
           <a:extLst>
             <a:ext uri="{909E8E84-426E-40dd-AFC4-6F175D3DCCD1}">
-              <a14:hiddenFill xmlns="" xmlns:a14="http://schemas.microsoft.com/office/drawing/2010/main">
+              <a14:hiddenFill xmlns:a14="http://schemas.microsoft.com/office/drawing/2010/main" xmlns="">
                 <a:solidFill>
                   <a:srgbClr val="FFFFFF"/>
                 </a:solidFill>
               </a14:hiddenFill>
             </a:ext>
             <a:ext uri="{91240B29-F687-4f45-9708-019B960494DF}">
-              <a14:hiddenLine xmlns="" xmlns:a14="http://schemas.microsoft.com/office/drawing/2010/main" w="9525">
+              <a14:hiddenLine xmlns:a14="http://schemas.microsoft.com/office/drawing/2010/main" xmlns="" w="9525">
                 <a:solidFill>
                   <a:srgbClr val="000000"/>
                 </a:solidFill>
@@ -7454,14 +7454,14 @@
           </a:ln>
           <a:extLst>
             <a:ext uri="{909E8E84-426E-40dd-AFC4-6F175D3DCCD1}">
-              <a14:hiddenFill xmlns="" xmlns:a14="http://schemas.microsoft.com/office/drawing/2010/main">
+              <a14:hiddenFill xmlns:a14="http://schemas.microsoft.com/office/drawing/2010/main" xmlns="">
                 <a:solidFill>
                   <a:srgbClr val="FFFFFF"/>
                 </a:solidFill>
               </a14:hiddenFill>
             </a:ext>
             <a:ext uri="{91240B29-F687-4f45-9708-019B960494DF}">
-              <a14:hiddenLine xmlns="" xmlns:a14="http://schemas.microsoft.com/office/drawing/2010/main" w="9525">
+              <a14:hiddenLine xmlns:a14="http://schemas.microsoft.com/office/drawing/2010/main" xmlns="" w="9525">
                 <a:solidFill>
                   <a:srgbClr val="000000"/>
                 </a:solidFill>
@@ -8910,14 +8910,14 @@
           </a:ln>
           <a:extLst>
             <a:ext uri="{909E8E84-426E-40dd-AFC4-6F175D3DCCD1}">
-              <a14:hiddenFill xmlns="" xmlns:a14="http://schemas.microsoft.com/office/drawing/2010/main">
+              <a14:hiddenFill xmlns:a14="http://schemas.microsoft.com/office/drawing/2010/main" xmlns="">
                 <a:solidFill>
                   <a:srgbClr val="FFFFFF"/>
                 </a:solidFill>
               </a14:hiddenFill>
             </a:ext>
             <a:ext uri="{91240B29-F687-4f45-9708-019B960494DF}">
-              <a14:hiddenLine xmlns="" xmlns:a14="http://schemas.microsoft.com/office/drawing/2010/main" w="9525">
+              <a14:hiddenLine xmlns:a14="http://schemas.microsoft.com/office/drawing/2010/main" xmlns="" w="9525">
                 <a:solidFill>
                   <a:srgbClr val="000000"/>
                 </a:solidFill>
@@ -10271,14 +10271,14 @@
           </a:ln>
           <a:extLst>
             <a:ext uri="{909E8E84-426E-40dd-AFC4-6F175D3DCCD1}">
-              <a14:hiddenFill xmlns="" xmlns:a14="http://schemas.microsoft.com/office/drawing/2010/main">
+              <a14:hiddenFill xmlns:a14="http://schemas.microsoft.com/office/drawing/2010/main" xmlns="">
                 <a:solidFill>
                   <a:srgbClr val="FFFFFF"/>
                 </a:solidFill>
               </a14:hiddenFill>
             </a:ext>
             <a:ext uri="{91240B29-F687-4f45-9708-019B960494DF}">
-              <a14:hiddenLine xmlns="" xmlns:a14="http://schemas.microsoft.com/office/drawing/2010/main" w="9525">
+              <a14:hiddenLine xmlns:a14="http://schemas.microsoft.com/office/drawing/2010/main" xmlns="" w="9525">
                 <a:solidFill>
                   <a:srgbClr val="000000"/>
                 </a:solidFill>
@@ -10836,14 +10836,14 @@
           </a:ln>
           <a:extLst>
             <a:ext uri="{909E8E84-426E-40dd-AFC4-6F175D3DCCD1}">
-              <a14:hiddenFill xmlns="" xmlns:a14="http://schemas.microsoft.com/office/drawing/2010/main">
+              <a14:hiddenFill xmlns:a14="http://schemas.microsoft.com/office/drawing/2010/main" xmlns="">
                 <a:solidFill>
                   <a:srgbClr val="FFFFFF"/>
                 </a:solidFill>
               </a14:hiddenFill>
             </a:ext>
             <a:ext uri="{91240B29-F687-4f45-9708-019B960494DF}">
-              <a14:hiddenLine xmlns="" xmlns:a14="http://schemas.microsoft.com/office/drawing/2010/main" w="9525">
+              <a14:hiddenLine xmlns:a14="http://schemas.microsoft.com/office/drawing/2010/main" xmlns="" w="9525">
                 <a:solidFill>
                   <a:srgbClr val="000000"/>
                 </a:solidFill>
@@ -11410,14 +11410,14 @@
           </a:ln>
           <a:extLst>
             <a:ext uri="{909E8E84-426E-40dd-AFC4-6F175D3DCCD1}">
-              <a14:hiddenFill xmlns="" xmlns:a14="http://schemas.microsoft.com/office/drawing/2010/main">
+              <a14:hiddenFill xmlns:a14="http://schemas.microsoft.com/office/drawing/2010/main" xmlns="">
                 <a:solidFill>
                   <a:srgbClr val="FFFFFF"/>
                 </a:solidFill>
               </a14:hiddenFill>
             </a:ext>
             <a:ext uri="{91240B29-F687-4f45-9708-019B960494DF}">
-              <a14:hiddenLine xmlns="" xmlns:a14="http://schemas.microsoft.com/office/drawing/2010/main" w="9525">
+              <a14:hiddenLine xmlns:a14="http://schemas.microsoft.com/office/drawing/2010/main" xmlns="" w="9525">
                 <a:solidFill>
                   <a:srgbClr val="000000"/>
                 </a:solidFill>
@@ -12357,14 +12357,14 @@
           </a:ln>
           <a:extLst>
             <a:ext uri="{909E8E84-426E-40dd-AFC4-6F175D3DCCD1}">
-              <a14:hiddenFill xmlns="" xmlns:a14="http://schemas.microsoft.com/office/drawing/2010/main">
+              <a14:hiddenFill xmlns:a14="http://schemas.microsoft.com/office/drawing/2010/main" xmlns="">
                 <a:solidFill>
                   <a:srgbClr val="FFFFFF"/>
                 </a:solidFill>
               </a14:hiddenFill>
             </a:ext>
             <a:ext uri="{91240B29-F687-4f45-9708-019B960494DF}">
-              <a14:hiddenLine xmlns="" xmlns:a14="http://schemas.microsoft.com/office/drawing/2010/main" w="9525">
+              <a14:hiddenLine xmlns:a14="http://schemas.microsoft.com/office/drawing/2010/main" xmlns="" w="9525">
                 <a:solidFill>
                   <a:srgbClr val="000000"/>
                 </a:solidFill>
@@ -13148,14 +13148,14 @@
           </a:ln>
           <a:extLst>
             <a:ext uri="{909E8E84-426E-40dd-AFC4-6F175D3DCCD1}">
-              <a14:hiddenFill xmlns="" xmlns:a14="http://schemas.microsoft.com/office/drawing/2010/main">
+              <a14:hiddenFill xmlns:a14="http://schemas.microsoft.com/office/drawing/2010/main" xmlns="">
                 <a:solidFill>
                   <a:srgbClr val="FFFFFF"/>
                 </a:solidFill>
               </a14:hiddenFill>
             </a:ext>
             <a:ext uri="{91240B29-F687-4f45-9708-019B960494DF}">
-              <a14:hiddenLine xmlns="" xmlns:a14="http://schemas.microsoft.com/office/drawing/2010/main" w="9525">
+              <a14:hiddenLine xmlns:a14="http://schemas.microsoft.com/office/drawing/2010/main" xmlns="" w="9525">
                 <a:solidFill>
                   <a:srgbClr val="000000"/>
                 </a:solidFill>
@@ -14593,7 +14593,7 @@
         </p:nvSpPr>
         <p:spPr>
           <a:xfrm>
-            <a:off x="1127883" y="4953598"/>
+            <a:off x="1127883" y="5440296"/>
             <a:ext cx="14420850" cy="557213"/>
           </a:xfrm>
         </p:spPr>
@@ -14862,15 +14862,7 @@
           <a:p>
             <a:r>
               <a:rPr lang="en-US" dirty="0" smtClean="0"/>
-              <a:t>default[</a:t>
-            </a:r>
-            <a:r>
-              <a:rPr lang="en-US" dirty="0" smtClean="0"/>
-              <a:t>'apache'][</a:t>
-            </a:r>
-            <a:r>
-              <a:rPr lang="en-US" dirty="0" smtClean="0"/>
-              <a:t>'</a:t>
+              <a:t>default['apache']['</a:t>
             </a:r>
             <a:r>
               <a:rPr lang="en-US" dirty="0" err="1" smtClean="0"/>
@@ -17584,11 +17576,7 @@
             </a:r>
             <a:r>
               <a:rPr lang="en-US" dirty="0" smtClean="0"/>
-              <a:t>&gt; node[</a:t>
-            </a:r>
-            <a:r>
-              <a:rPr lang="en-US" dirty="0" smtClean="0"/>
-              <a:t>'apache']</a:t>
+              <a:t>&gt; node['apache']</a:t>
             </a:r>
             <a:endParaRPr lang="en-US" dirty="0"/>
           </a:p>
@@ -18964,11 +18952,7 @@
             </a:r>
             <a:r>
               <a:rPr lang="en-US" dirty="0" smtClean="0"/>
-              <a:t>&gt; node[</a:t>
-            </a:r>
-            <a:r>
-              <a:rPr lang="en-US" dirty="0" smtClean="0"/>
-              <a:t>'</a:t>
+              <a:t>&gt; node['</a:t>
             </a:r>
             <a:r>
               <a:rPr lang="en-US" dirty="0" err="1" smtClean="0"/>
@@ -20292,7 +20276,15 @@
             </a:r>
             <a:r>
               <a:rPr lang="en-US" sz="2400" dirty="0"/>
-              <a:t>service When all attributes are default, on an unspecified platform converges successfully</a:t>
+              <a:t>service When all attributes are default, on an </a:t>
+            </a:r>
+            <a:r>
+              <a:rPr lang="en-US" sz="2400" dirty="0" smtClean="0"/>
+              <a:t>CentOS 6.7 </a:t>
+            </a:r>
+            <a:r>
+              <a:rPr lang="en-US" sz="2400" dirty="0"/>
+              <a:t>converges successfully</a:t>
             </a:r>
           </a:p>
           <a:p>
@@ -20551,15 +20543,7 @@
           <a:p>
             <a:r>
               <a:rPr lang="en-US" dirty="0" smtClean="0"/>
-              <a:t>default[</a:t>
-            </a:r>
-            <a:r>
-              <a:rPr lang="en-US" dirty="0" smtClean="0"/>
-              <a:t>'apache'][</a:t>
-            </a:r>
-            <a:r>
-              <a:rPr lang="en-US" dirty="0" smtClean="0"/>
-              <a:t>'</a:t>
+              <a:t>default['apache']['</a:t>
             </a:r>
             <a:r>
               <a:rPr lang="en-US" dirty="0" err="1" smtClean="0"/>
@@ -20585,11 +20569,7 @@
             </a:r>
             <a:r>
               <a:rPr lang="en-US" dirty="0" smtClean="0"/>
-              <a:t>'apache'][</a:t>
-            </a:r>
-            <a:r>
-              <a:rPr lang="en-US" dirty="0" smtClean="0"/>
-              <a:t>'</a:t>
+              <a:t>'apache']['</a:t>
             </a:r>
             <a:r>
               <a:rPr lang="en-US" dirty="0" err="1" smtClean="0"/>
@@ -24154,15 +24134,7 @@
           <a:p>
             <a:r>
               <a:rPr lang="en-US" dirty="0" smtClean="0"/>
-              <a:t>package node[</a:t>
-            </a:r>
-            <a:r>
-              <a:rPr lang="en-US" dirty="0" smtClean="0"/>
-              <a:t>'apache'][</a:t>
-            </a:r>
-            <a:r>
-              <a:rPr lang="en-US" dirty="0" smtClean="0"/>
-              <a:t>'</a:t>
+              <a:t>package node['apache']['</a:t>
             </a:r>
             <a:r>
               <a:rPr lang="en-US" dirty="0" err="1" smtClean="0"/>
@@ -24458,7 +24430,15 @@
             </a:r>
             <a:r>
               <a:rPr lang="en-US" dirty="0"/>
-              <a:t>default When all attributes are default, on an unspecified platform converges successfully</a:t>
+              <a:t>default When all attributes are default, on an </a:t>
+            </a:r>
+            <a:r>
+              <a:rPr lang="en-US" dirty="0" smtClean="0"/>
+              <a:t>CentOS 6.7 </a:t>
+            </a:r>
+            <a:r>
+              <a:rPr lang="en-US" dirty="0"/>
+              <a:t>converges successfully</a:t>
             </a:r>
           </a:p>
           <a:p>

</xml_diff>